<commit_message>
Updated code as per the Review Comments
</commit_message>
<xml_diff>
--- a/Address_Book_PPT.pptx
+++ b/Address_Book_PPT.pptx
@@ -12,7 +12,9 @@
     <p:sldId id="260" r:id="rId6"/>
     <p:sldId id="261" r:id="rId7"/>
     <p:sldId id="262" r:id="rId8"/>
-    <p:sldId id="263" r:id="rId9"/>
+    <p:sldId id="265" r:id="rId9"/>
+    <p:sldId id="266" r:id="rId10"/>
+    <p:sldId id="263" r:id="rId11"/>
   </p:sldIdLst>
   <p:sldSz cx="12192000" cy="6858000"/>
   <p:notesSz cx="6858000" cy="9144000"/>
@@ -124,7 +126,7 @@
   <pc:docChgLst>
     <pc:chgData name="SACHIN PRASAD" userId="52010858b1d90a02" providerId="LiveId" clId="{0ED408FC-0A70-44EB-BFCC-9021F86BC59C}"/>
     <pc:docChg chg="undo custSel addSld delSld modSld">
-      <pc:chgData name="SACHIN PRASAD" userId="52010858b1d90a02" providerId="LiveId" clId="{0ED408FC-0A70-44EB-BFCC-9021F86BC59C}" dt="2022-06-25T14:01:56.947" v="1356" actId="14100"/>
+      <pc:chgData name="SACHIN PRASAD" userId="52010858b1d90a02" providerId="LiveId" clId="{0ED408FC-0A70-44EB-BFCC-9021F86BC59C}" dt="2022-06-27T16:18:21.215" v="1446" actId="20577"/>
       <pc:docMkLst>
         <pc:docMk/>
       </pc:docMkLst>
@@ -386,7 +388,7 @@
         </pc:picChg>
       </pc:sldChg>
       <pc:sldChg chg="addSp delSp modSp new mod">
-        <pc:chgData name="SACHIN PRASAD" userId="52010858b1d90a02" providerId="LiveId" clId="{0ED408FC-0A70-44EB-BFCC-9021F86BC59C}" dt="2022-06-25T13:43:29.727" v="1001" actId="14100"/>
+        <pc:chgData name="SACHIN PRASAD" userId="52010858b1d90a02" providerId="LiveId" clId="{0ED408FC-0A70-44EB-BFCC-9021F86BC59C}" dt="2022-06-27T16:12:03.619" v="1358" actId="22"/>
         <pc:sldMkLst>
           <pc:docMk/>
           <pc:sldMk cId="2595117179" sldId="262"/>
@@ -407,6 +409,14 @@
             <ac:spMk id="3" creationId="{313EE53F-7E8A-AE6F-F9AC-A28A4B26FAB0}"/>
           </ac:spMkLst>
         </pc:spChg>
+        <pc:spChg chg="add del">
+          <ac:chgData name="SACHIN PRASAD" userId="52010858b1d90a02" providerId="LiveId" clId="{0ED408FC-0A70-44EB-BFCC-9021F86BC59C}" dt="2022-06-27T16:12:03.619" v="1358" actId="22"/>
+          <ac:spMkLst>
+            <pc:docMk/>
+            <pc:sldMk cId="2595117179" sldId="262"/>
+            <ac:spMk id="6" creationId="{9D422005-2DB1-900A-002E-F5932E16556E}"/>
+          </ac:spMkLst>
+        </pc:spChg>
         <pc:picChg chg="add mod ord">
           <ac:chgData name="SACHIN PRASAD" userId="52010858b1d90a02" providerId="LiveId" clId="{0ED408FC-0A70-44EB-BFCC-9021F86BC59C}" dt="2022-06-25T13:42:18.785" v="934" actId="1076"/>
           <ac:picMkLst>
@@ -417,7 +427,7 @@
         </pc:picChg>
       </pc:sldChg>
       <pc:sldChg chg="addSp delSp modSp new mod">
-        <pc:chgData name="SACHIN PRASAD" userId="52010858b1d90a02" providerId="LiveId" clId="{0ED408FC-0A70-44EB-BFCC-9021F86BC59C}" dt="2022-06-25T13:57:50.391" v="1340" actId="20577"/>
+        <pc:chgData name="SACHIN PRASAD" userId="52010858b1d90a02" providerId="LiveId" clId="{0ED408FC-0A70-44EB-BFCC-9021F86BC59C}" dt="2022-06-27T16:18:21.215" v="1446" actId="20577"/>
         <pc:sldMkLst>
           <pc:docMk/>
           <pc:sldMk cId="2835828311" sldId="263"/>
@@ -439,7 +449,7 @@
           </ac:spMkLst>
         </pc:spChg>
         <pc:spChg chg="add mod">
-          <ac:chgData name="SACHIN PRASAD" userId="52010858b1d90a02" providerId="LiveId" clId="{0ED408FC-0A70-44EB-BFCC-9021F86BC59C}" dt="2022-06-25T13:57:21.717" v="1336" actId="1076"/>
+          <ac:chgData name="SACHIN PRASAD" userId="52010858b1d90a02" providerId="LiveId" clId="{0ED408FC-0A70-44EB-BFCC-9021F86BC59C}" dt="2022-06-27T16:18:21.215" v="1446" actId="20577"/>
           <ac:spMkLst>
             <pc:docMk/>
             <pc:sldMk cId="2835828311" sldId="263"/>
@@ -470,6 +480,84 @@
           </ac:spMkLst>
         </pc:spChg>
       </pc:sldChg>
+      <pc:sldChg chg="addSp delSp modSp new mod">
+        <pc:chgData name="SACHIN PRASAD" userId="52010858b1d90a02" providerId="LiveId" clId="{0ED408FC-0A70-44EB-BFCC-9021F86BC59C}" dt="2022-06-27T16:15:27.424" v="1401" actId="113"/>
+        <pc:sldMkLst>
+          <pc:docMk/>
+          <pc:sldMk cId="1805586523" sldId="265"/>
+        </pc:sldMkLst>
+        <pc:spChg chg="mod">
+          <ac:chgData name="SACHIN PRASAD" userId="52010858b1d90a02" providerId="LiveId" clId="{0ED408FC-0A70-44EB-BFCC-9021F86BC59C}" dt="2022-06-27T16:15:27.424" v="1401" actId="113"/>
+          <ac:spMkLst>
+            <pc:docMk/>
+            <pc:sldMk cId="1805586523" sldId="265"/>
+            <ac:spMk id="2" creationId="{E5220FB3-9A6A-55E8-78EB-0BC7143E9437}"/>
+          </ac:spMkLst>
+        </pc:spChg>
+        <pc:spChg chg="del">
+          <ac:chgData name="SACHIN PRASAD" userId="52010858b1d90a02" providerId="LiveId" clId="{0ED408FC-0A70-44EB-BFCC-9021F86BC59C}" dt="2022-06-27T16:13:11.612" v="1374" actId="22"/>
+          <ac:spMkLst>
+            <pc:docMk/>
+            <pc:sldMk cId="1805586523" sldId="265"/>
+            <ac:spMk id="3" creationId="{54DB1197-AFAD-0514-1B6D-7BC57EA0E087}"/>
+          </ac:spMkLst>
+        </pc:spChg>
+        <pc:spChg chg="add mod">
+          <ac:chgData name="SACHIN PRASAD" userId="52010858b1d90a02" providerId="LiveId" clId="{0ED408FC-0A70-44EB-BFCC-9021F86BC59C}" dt="2022-06-27T16:14:11.514" v="1377" actId="478"/>
+          <ac:spMkLst>
+            <pc:docMk/>
+            <pc:sldMk cId="1805586523" sldId="265"/>
+            <ac:spMk id="7" creationId="{068C4C5D-50A5-8E93-5159-BFBA3BD6BFFE}"/>
+          </ac:spMkLst>
+        </pc:spChg>
+        <pc:picChg chg="add del mod ord">
+          <ac:chgData name="SACHIN PRASAD" userId="52010858b1d90a02" providerId="LiveId" clId="{0ED408FC-0A70-44EB-BFCC-9021F86BC59C}" dt="2022-06-27T16:14:11.514" v="1377" actId="478"/>
+          <ac:picMkLst>
+            <pc:docMk/>
+            <pc:sldMk cId="1805586523" sldId="265"/>
+            <ac:picMk id="5" creationId="{335A6C61-EE2D-A5C0-4FE9-B008485D284A}"/>
+          </ac:picMkLst>
+        </pc:picChg>
+        <pc:picChg chg="add mod">
+          <ac:chgData name="SACHIN PRASAD" userId="52010858b1d90a02" providerId="LiveId" clId="{0ED408FC-0A70-44EB-BFCC-9021F86BC59C}" dt="2022-06-27T16:14:19.387" v="1382" actId="1076"/>
+          <ac:picMkLst>
+            <pc:docMk/>
+            <pc:sldMk cId="1805586523" sldId="265"/>
+            <ac:picMk id="9" creationId="{9F4D609F-0C3B-4DA4-B3DE-D37BF6CAEA15}"/>
+          </ac:picMkLst>
+        </pc:picChg>
+      </pc:sldChg>
+      <pc:sldChg chg="addSp delSp modSp new mod">
+        <pc:chgData name="SACHIN PRASAD" userId="52010858b1d90a02" providerId="LiveId" clId="{0ED408FC-0A70-44EB-BFCC-9021F86BC59C}" dt="2022-06-27T16:17:48.303" v="1445" actId="20577"/>
+        <pc:sldMkLst>
+          <pc:docMk/>
+          <pc:sldMk cId="3851210237" sldId="266"/>
+        </pc:sldMkLst>
+        <pc:spChg chg="mod">
+          <ac:chgData name="SACHIN PRASAD" userId="52010858b1d90a02" providerId="LiveId" clId="{0ED408FC-0A70-44EB-BFCC-9021F86BC59C}" dt="2022-06-27T16:17:48.303" v="1445" actId="20577"/>
+          <ac:spMkLst>
+            <pc:docMk/>
+            <pc:sldMk cId="3851210237" sldId="266"/>
+            <ac:spMk id="2" creationId="{41DB69CF-BEAE-DCF9-6BF8-0AD2B330619D}"/>
+          </ac:spMkLst>
+        </pc:spChg>
+        <pc:spChg chg="del">
+          <ac:chgData name="SACHIN PRASAD" userId="52010858b1d90a02" providerId="LiveId" clId="{0ED408FC-0A70-44EB-BFCC-9021F86BC59C}" dt="2022-06-27T16:16:50.398" v="1403" actId="22"/>
+          <ac:spMkLst>
+            <pc:docMk/>
+            <pc:sldMk cId="3851210237" sldId="266"/>
+            <ac:spMk id="3" creationId="{33310F23-59D3-C7B5-E0BA-D2409C75EA95}"/>
+          </ac:spMkLst>
+        </pc:spChg>
+        <pc:picChg chg="add mod ord">
+          <ac:chgData name="SACHIN PRASAD" userId="52010858b1d90a02" providerId="LiveId" clId="{0ED408FC-0A70-44EB-BFCC-9021F86BC59C}" dt="2022-06-27T16:16:57.442" v="1407" actId="1076"/>
+          <ac:picMkLst>
+            <pc:docMk/>
+            <pc:sldMk cId="3851210237" sldId="266"/>
+            <ac:picMk id="5" creationId="{3E0566C9-5C5D-4D2B-4FDB-E681B4F176A8}"/>
+          </ac:picMkLst>
+        </pc:picChg>
+      </pc:sldChg>
     </pc:docChg>
   </pc:docChgLst>
 </pc:chgInfo>
@@ -624,7 +712,7 @@
           <a:p>
             <a:fld id="{9B8A59D3-553E-4FED-BD76-35CEE34A9989}" type="datetimeFigureOut">
               <a:rPr lang="en-IN" smtClean="0"/>
-              <a:t>25-06-2022</a:t>
+              <a:t>27-06-2022</a:t>
             </a:fld>
             <a:endParaRPr lang="en-IN"/>
           </a:p>
@@ -824,7 +912,7 @@
           <a:p>
             <a:fld id="{9B8A59D3-553E-4FED-BD76-35CEE34A9989}" type="datetimeFigureOut">
               <a:rPr lang="en-IN" smtClean="0"/>
-              <a:t>25-06-2022</a:t>
+              <a:t>27-06-2022</a:t>
             </a:fld>
             <a:endParaRPr lang="en-IN"/>
           </a:p>
@@ -1034,7 +1122,7 @@
           <a:p>
             <a:fld id="{9B8A59D3-553E-4FED-BD76-35CEE34A9989}" type="datetimeFigureOut">
               <a:rPr lang="en-IN" smtClean="0"/>
-              <a:t>25-06-2022</a:t>
+              <a:t>27-06-2022</a:t>
             </a:fld>
             <a:endParaRPr lang="en-IN"/>
           </a:p>
@@ -1234,7 +1322,7 @@
           <a:p>
             <a:fld id="{9B8A59D3-553E-4FED-BD76-35CEE34A9989}" type="datetimeFigureOut">
               <a:rPr lang="en-IN" smtClean="0"/>
-              <a:t>25-06-2022</a:t>
+              <a:t>27-06-2022</a:t>
             </a:fld>
             <a:endParaRPr lang="en-IN"/>
           </a:p>
@@ -1510,7 +1598,7 @@
           <a:p>
             <a:fld id="{9B8A59D3-553E-4FED-BD76-35CEE34A9989}" type="datetimeFigureOut">
               <a:rPr lang="en-IN" smtClean="0"/>
-              <a:t>25-06-2022</a:t>
+              <a:t>27-06-2022</a:t>
             </a:fld>
             <a:endParaRPr lang="en-IN"/>
           </a:p>
@@ -1778,7 +1866,7 @@
           <a:p>
             <a:fld id="{9B8A59D3-553E-4FED-BD76-35CEE34A9989}" type="datetimeFigureOut">
               <a:rPr lang="en-IN" smtClean="0"/>
-              <a:t>25-06-2022</a:t>
+              <a:t>27-06-2022</a:t>
             </a:fld>
             <a:endParaRPr lang="en-IN"/>
           </a:p>
@@ -2193,7 +2281,7 @@
           <a:p>
             <a:fld id="{9B8A59D3-553E-4FED-BD76-35CEE34A9989}" type="datetimeFigureOut">
               <a:rPr lang="en-IN" smtClean="0"/>
-              <a:t>25-06-2022</a:t>
+              <a:t>27-06-2022</a:t>
             </a:fld>
             <a:endParaRPr lang="en-IN"/>
           </a:p>
@@ -2335,7 +2423,7 @@
           <a:p>
             <a:fld id="{9B8A59D3-553E-4FED-BD76-35CEE34A9989}" type="datetimeFigureOut">
               <a:rPr lang="en-IN" smtClean="0"/>
-              <a:t>25-06-2022</a:t>
+              <a:t>27-06-2022</a:t>
             </a:fld>
             <a:endParaRPr lang="en-IN"/>
           </a:p>
@@ -2448,7 +2536,7 @@
           <a:p>
             <a:fld id="{9B8A59D3-553E-4FED-BD76-35CEE34A9989}" type="datetimeFigureOut">
               <a:rPr lang="en-IN" smtClean="0"/>
-              <a:t>25-06-2022</a:t>
+              <a:t>27-06-2022</a:t>
             </a:fld>
             <a:endParaRPr lang="en-IN"/>
           </a:p>
@@ -2761,7 +2849,7 @@
           <a:p>
             <a:fld id="{9B8A59D3-553E-4FED-BD76-35CEE34A9989}" type="datetimeFigureOut">
               <a:rPr lang="en-IN" smtClean="0"/>
-              <a:t>25-06-2022</a:t>
+              <a:t>27-06-2022</a:t>
             </a:fld>
             <a:endParaRPr lang="en-IN"/>
           </a:p>
@@ -3050,7 +3138,7 @@
           <a:p>
             <a:fld id="{9B8A59D3-553E-4FED-BD76-35CEE34A9989}" type="datetimeFigureOut">
               <a:rPr lang="en-IN" smtClean="0"/>
-              <a:t>25-06-2022</a:t>
+              <a:t>27-06-2022</a:t>
             </a:fld>
             <a:endParaRPr lang="en-IN"/>
           </a:p>
@@ -3293,7 +3381,7 @@
           <a:p>
             <a:fld id="{9B8A59D3-553E-4FED-BD76-35CEE34A9989}" type="datetimeFigureOut">
               <a:rPr lang="en-IN" smtClean="0"/>
-              <a:t>25-06-2022</a:t>
+              <a:t>27-06-2022</a:t>
             </a:fld>
             <a:endParaRPr lang="en-IN"/>
           </a:p>
@@ -3765,6 +3853,339 @@
 </p:sld>
 </file>
 
+<file path=ppt/slides/slide10.xml><?xml version="1.0" encoding="utf-8"?>
+<p:sld xmlns:a="http://schemas.openxmlformats.org/drawingml/2006/main" xmlns:r="http://schemas.openxmlformats.org/officeDocument/2006/relationships" xmlns:p="http://schemas.openxmlformats.org/presentationml/2006/main">
+  <p:cSld>
+    <p:spTree>
+      <p:nvGrpSpPr>
+        <p:cNvPr id="1" name=""/>
+        <p:cNvGrpSpPr/>
+        <p:nvPr/>
+      </p:nvGrpSpPr>
+      <p:grpSpPr>
+        <a:xfrm>
+          <a:off x="0" y="0"/>
+          <a:ext cx="0" cy="0"/>
+          <a:chOff x="0" y="0"/>
+          <a:chExt cx="0" cy="0"/>
+        </a:xfrm>
+      </p:grpSpPr>
+      <p:sp>
+        <p:nvSpPr>
+          <p:cNvPr id="3" name="TextBox 2">
+            <a:extLst>
+              <a:ext uri="{FF2B5EF4-FFF2-40B4-BE49-F238E27FC236}">
+                <a16:creationId xmlns:a16="http://schemas.microsoft.com/office/drawing/2014/main" id="{206E553B-852F-FB63-B6A8-F6D4E61868E0}"/>
+              </a:ext>
+            </a:extLst>
+          </p:cNvPr>
+          <p:cNvSpPr txBox="1"/>
+          <p:nvPr/>
+        </p:nvSpPr>
+        <p:spPr>
+          <a:xfrm>
+            <a:off x="1579651" y="756024"/>
+            <a:ext cx="6097712" cy="1477328"/>
+          </a:xfrm>
+          <a:prstGeom prst="rect">
+            <a:avLst/>
+          </a:prstGeom>
+          <a:noFill/>
+        </p:spPr>
+        <p:txBody>
+          <a:bodyPr wrap="square">
+            <a:spAutoFit/>
+          </a:bodyPr>
+          <a:lstStyle/>
+          <a:p>
+            <a:r>
+              <a:rPr lang="en-IN" b="1" i="0" dirty="0">
+                <a:solidFill>
+                  <a:srgbClr val="00B0F0"/>
+                </a:solidFill>
+                <a:effectLst/>
+                <a:latin typeface="-apple-system"/>
+              </a:rPr>
+              <a:t>Technologies &amp; Tools used</a:t>
+            </a:r>
+          </a:p>
+          <a:p>
+            <a:pPr algn="l">
+              <a:buFont typeface="+mj-lt"/>
+              <a:buAutoNum type="arabicPeriod"/>
+            </a:pPr>
+            <a:r>
+              <a:rPr lang="en-US" b="0" i="0" dirty="0">
+                <a:solidFill>
+                  <a:srgbClr val="24292F"/>
+                </a:solidFill>
+                <a:effectLst/>
+                <a:latin typeface="-apple-system"/>
+              </a:rPr>
+              <a:t>Java 1.8, Spring Framework</a:t>
+            </a:r>
+          </a:p>
+          <a:p>
+            <a:pPr algn="l">
+              <a:buFont typeface="+mj-lt"/>
+              <a:buAutoNum type="arabicPeriod"/>
+            </a:pPr>
+            <a:r>
+              <a:rPr lang="en-US" dirty="0">
+                <a:solidFill>
+                  <a:srgbClr val="24292F"/>
+                </a:solidFill>
+                <a:latin typeface="-apple-system"/>
+              </a:rPr>
+              <a:t>HTML, CSS</a:t>
+            </a:r>
+            <a:endParaRPr lang="en-US" b="0" i="0" dirty="0">
+              <a:solidFill>
+                <a:srgbClr val="24292F"/>
+              </a:solidFill>
+              <a:effectLst/>
+              <a:latin typeface="-apple-system"/>
+            </a:endParaRPr>
+          </a:p>
+          <a:p>
+            <a:pPr algn="l">
+              <a:buFont typeface="+mj-lt"/>
+              <a:buAutoNum type="arabicPeriod"/>
+            </a:pPr>
+            <a:r>
+              <a:rPr lang="en-US" b="0" i="0" dirty="0">
+                <a:solidFill>
+                  <a:srgbClr val="24292F"/>
+                </a:solidFill>
+                <a:effectLst/>
+                <a:latin typeface="-apple-system"/>
+              </a:rPr>
+              <a:t>Build tool – Maven</a:t>
+            </a:r>
+          </a:p>
+          <a:p>
+            <a:pPr algn="l">
+              <a:buFont typeface="+mj-lt"/>
+              <a:buAutoNum type="arabicPeriod"/>
+            </a:pPr>
+            <a:r>
+              <a:rPr lang="en-US" b="0" i="0" dirty="0">
+                <a:solidFill>
+                  <a:srgbClr val="24292F"/>
+                </a:solidFill>
+                <a:effectLst/>
+                <a:latin typeface="-apple-system"/>
+              </a:rPr>
+              <a:t>In memory H2 database.</a:t>
+            </a:r>
+          </a:p>
+        </p:txBody>
+      </p:sp>
+      <p:sp>
+        <p:nvSpPr>
+          <p:cNvPr id="7" name="TextBox 6">
+            <a:extLst>
+              <a:ext uri="{FF2B5EF4-FFF2-40B4-BE49-F238E27FC236}">
+                <a16:creationId xmlns:a16="http://schemas.microsoft.com/office/drawing/2014/main" id="{BBC793A8-87AA-0225-381B-B4B6E7CC2D66}"/>
+              </a:ext>
+            </a:extLst>
+          </p:cNvPr>
+          <p:cNvSpPr txBox="1"/>
+          <p:nvPr/>
+        </p:nvSpPr>
+        <p:spPr>
+          <a:xfrm>
+            <a:off x="7107148" y="2233352"/>
+            <a:ext cx="6097712" cy="1200329"/>
+          </a:xfrm>
+          <a:prstGeom prst="rect">
+            <a:avLst/>
+          </a:prstGeom>
+          <a:noFill/>
+        </p:spPr>
+        <p:txBody>
+          <a:bodyPr wrap="square">
+            <a:spAutoFit/>
+          </a:bodyPr>
+          <a:lstStyle/>
+          <a:p>
+            <a:pPr algn="l"/>
+            <a:r>
+              <a:rPr lang="en-IN" b="1" i="0" dirty="0">
+                <a:solidFill>
+                  <a:srgbClr val="FF0000"/>
+                </a:solidFill>
+                <a:effectLst/>
+                <a:latin typeface="-apple-system"/>
+              </a:rPr>
+              <a:t>Out of Scope</a:t>
+            </a:r>
+            <a:endParaRPr lang="en-IN" b="1" dirty="0">
+              <a:solidFill>
+                <a:srgbClr val="24292F"/>
+              </a:solidFill>
+              <a:latin typeface="-apple-system"/>
+            </a:endParaRPr>
+          </a:p>
+          <a:p>
+            <a:pPr algn="l"/>
+            <a:r>
+              <a:rPr lang="en-US" b="0" i="0" dirty="0">
+                <a:solidFill>
+                  <a:srgbClr val="24292F"/>
+                </a:solidFill>
+                <a:effectLst/>
+                <a:latin typeface="-apple-system"/>
+              </a:rPr>
+              <a:t>Application does not cover the below</a:t>
+            </a:r>
+          </a:p>
+          <a:p>
+            <a:pPr algn="l">
+              <a:buFont typeface="+mj-lt"/>
+              <a:buAutoNum type="arabicPeriod"/>
+            </a:pPr>
+            <a:r>
+              <a:rPr lang="en-US" b="0" i="0" dirty="0">
+                <a:solidFill>
+                  <a:srgbClr val="24292F"/>
+                </a:solidFill>
+                <a:effectLst/>
+                <a:latin typeface="-apple-system"/>
+              </a:rPr>
+              <a:t>User Authentication</a:t>
+            </a:r>
+          </a:p>
+          <a:p>
+            <a:pPr algn="l"/>
+            <a:endParaRPr lang="en-IN" b="1" i="0" dirty="0">
+              <a:solidFill>
+                <a:srgbClr val="24292F"/>
+              </a:solidFill>
+              <a:effectLst/>
+              <a:latin typeface="-apple-system"/>
+            </a:endParaRPr>
+          </a:p>
+        </p:txBody>
+      </p:sp>
+      <p:sp>
+        <p:nvSpPr>
+          <p:cNvPr id="9" name="TextBox 8">
+            <a:extLst>
+              <a:ext uri="{FF2B5EF4-FFF2-40B4-BE49-F238E27FC236}">
+                <a16:creationId xmlns:a16="http://schemas.microsoft.com/office/drawing/2014/main" id="{0D5330C0-46DC-CEFE-5653-22A345BFBC57}"/>
+              </a:ext>
+            </a:extLst>
+          </p:cNvPr>
+          <p:cNvSpPr txBox="1"/>
+          <p:nvPr/>
+        </p:nvSpPr>
+        <p:spPr>
+          <a:xfrm>
+            <a:off x="1453793" y="4024484"/>
+            <a:ext cx="6349428" cy="1200329"/>
+          </a:xfrm>
+          <a:prstGeom prst="rect">
+            <a:avLst/>
+          </a:prstGeom>
+          <a:noFill/>
+        </p:spPr>
+        <p:txBody>
+          <a:bodyPr wrap="square">
+            <a:spAutoFit/>
+          </a:bodyPr>
+          <a:lstStyle/>
+          <a:p>
+            <a:r>
+              <a:rPr lang="en-IN" b="1" i="0" dirty="0">
+                <a:solidFill>
+                  <a:srgbClr val="92D050"/>
+                </a:solidFill>
+                <a:effectLst/>
+                <a:latin typeface="-apple-system"/>
+              </a:rPr>
+              <a:t>Future scope</a:t>
+            </a:r>
+          </a:p>
+          <a:p>
+            <a:pPr algn="l"/>
+            <a:r>
+              <a:rPr lang="en-US" dirty="0">
+                <a:solidFill>
+                  <a:srgbClr val="24292F"/>
+                </a:solidFill>
+                <a:latin typeface="-apple-system"/>
+              </a:rPr>
+              <a:t>1.A</a:t>
+            </a:r>
+            <a:r>
+              <a:rPr lang="en-US" b="0" i="0" dirty="0">
+                <a:solidFill>
+                  <a:srgbClr val="24292F"/>
+                </a:solidFill>
+                <a:effectLst/>
+                <a:latin typeface="-apple-system"/>
+              </a:rPr>
+              <a:t>dding database for persistent storage</a:t>
+            </a:r>
+          </a:p>
+          <a:p>
+            <a:pPr algn="l"/>
+            <a:r>
+              <a:rPr lang="en-US" dirty="0">
+                <a:solidFill>
+                  <a:srgbClr val="24292F"/>
+                </a:solidFill>
+                <a:latin typeface="-apple-system"/>
+              </a:rPr>
+              <a:t>2.</a:t>
+            </a:r>
+            <a:r>
+              <a:rPr lang="en-US" b="1" dirty="0">
+                <a:solidFill>
+                  <a:srgbClr val="24292F"/>
+                </a:solidFill>
+                <a:latin typeface="-apple-system"/>
+              </a:rPr>
+              <a:t>Angular or ReactJS </a:t>
+            </a:r>
+            <a:r>
+              <a:rPr lang="en-US" dirty="0">
+                <a:solidFill>
+                  <a:srgbClr val="24292F"/>
+                </a:solidFill>
+                <a:latin typeface="-apple-system"/>
+              </a:rPr>
+              <a:t>to create Single page Reactive Application </a:t>
+            </a:r>
+          </a:p>
+          <a:p>
+            <a:pPr algn="l"/>
+            <a:r>
+              <a:rPr lang="en-US" dirty="0">
+                <a:solidFill>
+                  <a:srgbClr val="24292F"/>
+                </a:solidFill>
+                <a:latin typeface="-apple-system"/>
+              </a:rPr>
+              <a:t>3.Proper Authentication</a:t>
+            </a:r>
+          </a:p>
+        </p:txBody>
+      </p:sp>
+    </p:spTree>
+    <p:extLst>
+      <p:ext uri="{BB962C8B-B14F-4D97-AF65-F5344CB8AC3E}">
+        <p14:creationId xmlns:p14="http://schemas.microsoft.com/office/powerpoint/2010/main" val="2835828311"/>
+      </p:ext>
+    </p:extLst>
+  </p:cSld>
+  <p:clrMapOvr>
+    <a:masterClrMapping/>
+  </p:clrMapOvr>
+</p:sld>
+</file>
+
 <file path=ppt/slides/slide2.xml><?xml version="1.0" encoding="utf-8"?>
 <p:sld xmlns:a="http://schemas.openxmlformats.org/drawingml/2006/main" xmlns:r="http://schemas.openxmlformats.org/officeDocument/2006/relationships" xmlns:p="http://schemas.openxmlformats.org/presentationml/2006/main">
   <p:cSld>
@@ -4545,343 +4966,186 @@
       </p:grpSpPr>
       <p:sp>
         <p:nvSpPr>
-          <p:cNvPr id="3" name="TextBox 2">
-            <a:extLst>
-              <a:ext uri="{FF2B5EF4-FFF2-40B4-BE49-F238E27FC236}">
-                <a16:creationId xmlns:a16="http://schemas.microsoft.com/office/drawing/2014/main" id="{206E553B-852F-FB63-B6A8-F6D4E61868E0}"/>
-              </a:ext>
-            </a:extLst>
-          </p:cNvPr>
-          <p:cNvSpPr txBox="1"/>
+          <p:cNvPr id="2" name="Title 1">
+            <a:extLst>
+              <a:ext uri="{FF2B5EF4-FFF2-40B4-BE49-F238E27FC236}">
+                <a16:creationId xmlns:a16="http://schemas.microsoft.com/office/drawing/2014/main" id="{E5220FB3-9A6A-55E8-78EB-0BC7143E9437}"/>
+              </a:ext>
+            </a:extLst>
+          </p:cNvPr>
+          <p:cNvSpPr>
+            <a:spLocks noGrp="1"/>
+          </p:cNvSpPr>
+          <p:nvPr>
+            <p:ph type="title"/>
+          </p:nvPr>
+        </p:nvSpPr>
+        <p:spPr/>
+        <p:txBody>
+          <a:bodyPr>
+            <a:normAutofit/>
+          </a:bodyPr>
+          <a:lstStyle/>
+          <a:p>
+            <a:r>
+              <a:rPr lang="en-IN" sz="2000" b="1" dirty="0">
+                <a:latin typeface="+mn-lt"/>
+              </a:rPr>
+              <a:t>Added Exception Handler</a:t>
+            </a:r>
+          </a:p>
+        </p:txBody>
+      </p:sp>
+      <p:sp>
+        <p:nvSpPr>
+          <p:cNvPr id="7" name="Content Placeholder 6">
+            <a:extLst>
+              <a:ext uri="{FF2B5EF4-FFF2-40B4-BE49-F238E27FC236}">
+                <a16:creationId xmlns:a16="http://schemas.microsoft.com/office/drawing/2014/main" id="{068C4C5D-50A5-8E93-5159-BFBA3BD6BFFE}"/>
+              </a:ext>
+            </a:extLst>
+          </p:cNvPr>
+          <p:cNvSpPr>
+            <a:spLocks noGrp="1"/>
+          </p:cNvSpPr>
+          <p:nvPr>
+            <p:ph idx="1"/>
+          </p:nvPr>
+        </p:nvSpPr>
+        <p:spPr/>
+        <p:txBody>
+          <a:bodyPr/>
+          <a:lstStyle/>
+          <a:p>
+            <a:endParaRPr lang="en-IN"/>
+          </a:p>
+        </p:txBody>
+      </p:sp>
+      <p:pic>
+        <p:nvPicPr>
+          <p:cNvPr id="9" name="Picture 8">
+            <a:extLst>
+              <a:ext uri="{FF2B5EF4-FFF2-40B4-BE49-F238E27FC236}">
+                <a16:creationId xmlns:a16="http://schemas.microsoft.com/office/drawing/2014/main" id="{9F4D609F-0C3B-4DA4-B3DE-D37BF6CAEA15}"/>
+              </a:ext>
+            </a:extLst>
+          </p:cNvPr>
+          <p:cNvPicPr>
+            <a:picLocks noChangeAspect="1"/>
+          </p:cNvPicPr>
           <p:nvPr/>
-        </p:nvSpPr>
+        </p:nvPicPr>
+        <p:blipFill>
+          <a:blip r:embed="rId2"/>
+          <a:stretch>
+            <a:fillRect/>
+          </a:stretch>
+        </p:blipFill>
         <p:spPr>
           <a:xfrm>
-            <a:off x="1579651" y="756024"/>
-            <a:ext cx="6097712" cy="1477328"/>
+            <a:off x="701639" y="1690688"/>
+            <a:ext cx="10788721" cy="5025194"/>
           </a:xfrm>
           <a:prstGeom prst="rect">
             <a:avLst/>
           </a:prstGeom>
-          <a:noFill/>
         </p:spPr>
-        <p:txBody>
-          <a:bodyPr wrap="square">
-            <a:spAutoFit/>
-          </a:bodyPr>
-          <a:lstStyle/>
-          <a:p>
-            <a:r>
-              <a:rPr lang="en-IN" b="1" i="0" dirty="0">
-                <a:solidFill>
-                  <a:srgbClr val="00B0F0"/>
-                </a:solidFill>
-                <a:effectLst/>
-                <a:latin typeface="-apple-system"/>
-              </a:rPr>
-              <a:t>Technologies &amp; Tools used</a:t>
-            </a:r>
-          </a:p>
-          <a:p>
-            <a:pPr algn="l">
-              <a:buFont typeface="+mj-lt"/>
-              <a:buAutoNum type="arabicPeriod"/>
-            </a:pPr>
-            <a:r>
-              <a:rPr lang="en-US" b="0" i="0" dirty="0">
-                <a:solidFill>
-                  <a:srgbClr val="24292F"/>
-                </a:solidFill>
-                <a:effectLst/>
-                <a:latin typeface="-apple-system"/>
-              </a:rPr>
-              <a:t>Java 1.8, Spring Framework</a:t>
-            </a:r>
-          </a:p>
-          <a:p>
-            <a:pPr algn="l">
-              <a:buFont typeface="+mj-lt"/>
-              <a:buAutoNum type="arabicPeriod"/>
-            </a:pPr>
-            <a:r>
-              <a:rPr lang="en-US" dirty="0">
-                <a:solidFill>
-                  <a:srgbClr val="24292F"/>
-                </a:solidFill>
-                <a:latin typeface="-apple-system"/>
-              </a:rPr>
-              <a:t>HTML, CSS</a:t>
-            </a:r>
-            <a:endParaRPr lang="en-US" b="0" i="0" dirty="0">
-              <a:solidFill>
-                <a:srgbClr val="24292F"/>
-              </a:solidFill>
-              <a:effectLst/>
-              <a:latin typeface="-apple-system"/>
-            </a:endParaRPr>
-          </a:p>
-          <a:p>
-            <a:pPr algn="l">
-              <a:buFont typeface="+mj-lt"/>
-              <a:buAutoNum type="arabicPeriod"/>
-            </a:pPr>
-            <a:r>
-              <a:rPr lang="en-US" b="0" i="0" dirty="0">
-                <a:solidFill>
-                  <a:srgbClr val="24292F"/>
-                </a:solidFill>
-                <a:effectLst/>
-                <a:latin typeface="-apple-system"/>
-              </a:rPr>
-              <a:t>Build tool – Maven</a:t>
-            </a:r>
-          </a:p>
-          <a:p>
-            <a:pPr algn="l">
-              <a:buFont typeface="+mj-lt"/>
-              <a:buAutoNum type="arabicPeriod"/>
-            </a:pPr>
-            <a:r>
-              <a:rPr lang="en-US" b="0" i="0" dirty="0">
-                <a:solidFill>
-                  <a:srgbClr val="24292F"/>
-                </a:solidFill>
-                <a:effectLst/>
-                <a:latin typeface="-apple-system"/>
-              </a:rPr>
-              <a:t>In memory H2 database.</a:t>
-            </a:r>
-          </a:p>
-        </p:txBody>
-      </p:sp>
-      <p:sp>
-        <p:nvSpPr>
-          <p:cNvPr id="7" name="TextBox 6">
-            <a:extLst>
-              <a:ext uri="{FF2B5EF4-FFF2-40B4-BE49-F238E27FC236}">
-                <a16:creationId xmlns:a16="http://schemas.microsoft.com/office/drawing/2014/main" id="{BBC793A8-87AA-0225-381B-B4B6E7CC2D66}"/>
-              </a:ext>
-            </a:extLst>
-          </p:cNvPr>
-          <p:cNvSpPr txBox="1"/>
-          <p:nvPr/>
-        </p:nvSpPr>
-        <p:spPr>
-          <a:xfrm>
-            <a:off x="7107148" y="2233352"/>
-            <a:ext cx="6097712" cy="1754326"/>
-          </a:xfrm>
-          <a:prstGeom prst="rect">
-            <a:avLst/>
-          </a:prstGeom>
-          <a:noFill/>
-        </p:spPr>
-        <p:txBody>
-          <a:bodyPr wrap="square">
-            <a:spAutoFit/>
-          </a:bodyPr>
-          <a:lstStyle/>
-          <a:p>
-            <a:pPr algn="l"/>
-            <a:r>
-              <a:rPr lang="en-IN" b="1" i="0" dirty="0">
-                <a:solidFill>
-                  <a:srgbClr val="FF0000"/>
-                </a:solidFill>
-                <a:effectLst/>
-                <a:latin typeface="-apple-system"/>
-              </a:rPr>
-              <a:t>Out of Scope</a:t>
-            </a:r>
-            <a:endParaRPr lang="en-IN" b="1" dirty="0">
-              <a:solidFill>
-                <a:srgbClr val="24292F"/>
-              </a:solidFill>
-              <a:latin typeface="-apple-system"/>
-            </a:endParaRPr>
-          </a:p>
-          <a:p>
-            <a:pPr algn="l"/>
-            <a:r>
-              <a:rPr lang="en-US" b="0" i="0" dirty="0">
-                <a:solidFill>
-                  <a:srgbClr val="24292F"/>
-                </a:solidFill>
-                <a:effectLst/>
-                <a:latin typeface="-apple-system"/>
-              </a:rPr>
-              <a:t>Application does not cover the below</a:t>
-            </a:r>
-          </a:p>
-          <a:p>
-            <a:pPr algn="l">
-              <a:buFont typeface="+mj-lt"/>
-              <a:buAutoNum type="arabicPeriod"/>
-            </a:pPr>
-            <a:r>
-              <a:rPr lang="en-US" b="0" i="0" dirty="0">
-                <a:solidFill>
-                  <a:srgbClr val="24292F"/>
-                </a:solidFill>
-                <a:effectLst/>
-                <a:latin typeface="-apple-system"/>
-              </a:rPr>
-              <a:t>User Authentication</a:t>
-            </a:r>
-          </a:p>
-          <a:p>
-            <a:pPr algn="l">
-              <a:buFont typeface="+mj-lt"/>
-              <a:buAutoNum type="arabicPeriod"/>
-            </a:pPr>
-            <a:r>
-              <a:rPr lang="en-US" b="0" i="0" dirty="0">
-                <a:solidFill>
-                  <a:srgbClr val="24292F"/>
-                </a:solidFill>
-                <a:effectLst/>
-                <a:latin typeface="-apple-system"/>
-              </a:rPr>
-              <a:t>Exception handling</a:t>
-            </a:r>
-          </a:p>
-          <a:p>
-            <a:pPr algn="l">
-              <a:buFont typeface="+mj-lt"/>
-              <a:buAutoNum type="arabicPeriod"/>
-            </a:pPr>
-            <a:r>
-              <a:rPr lang="en-US" b="0" i="0" dirty="0">
-                <a:solidFill>
-                  <a:srgbClr val="24292F"/>
-                </a:solidFill>
-                <a:effectLst/>
-                <a:latin typeface="-apple-system"/>
-              </a:rPr>
-              <a:t>Data Types</a:t>
-            </a:r>
-          </a:p>
-          <a:p>
-            <a:pPr algn="l"/>
-            <a:endParaRPr lang="en-IN" b="1" i="0" dirty="0">
-              <a:solidFill>
-                <a:srgbClr val="24292F"/>
-              </a:solidFill>
-              <a:effectLst/>
-              <a:latin typeface="-apple-system"/>
-            </a:endParaRPr>
-          </a:p>
-        </p:txBody>
-      </p:sp>
-      <p:sp>
-        <p:nvSpPr>
-          <p:cNvPr id="9" name="TextBox 8">
-            <a:extLst>
-              <a:ext uri="{FF2B5EF4-FFF2-40B4-BE49-F238E27FC236}">
-                <a16:creationId xmlns:a16="http://schemas.microsoft.com/office/drawing/2014/main" id="{0D5330C0-46DC-CEFE-5653-22A345BFBC57}"/>
-              </a:ext>
-            </a:extLst>
-          </p:cNvPr>
-          <p:cNvSpPr txBox="1"/>
-          <p:nvPr/>
-        </p:nvSpPr>
-        <p:spPr>
-          <a:xfrm>
-            <a:off x="1453793" y="4024484"/>
-            <a:ext cx="6349428" cy="1200329"/>
-          </a:xfrm>
-          <a:prstGeom prst="rect">
-            <a:avLst/>
-          </a:prstGeom>
-          <a:noFill/>
-        </p:spPr>
-        <p:txBody>
-          <a:bodyPr wrap="square">
-            <a:spAutoFit/>
-          </a:bodyPr>
-          <a:lstStyle/>
-          <a:p>
-            <a:r>
-              <a:rPr lang="en-IN" b="1" i="0" dirty="0">
-                <a:solidFill>
-                  <a:srgbClr val="92D050"/>
-                </a:solidFill>
-                <a:effectLst/>
-                <a:latin typeface="-apple-system"/>
-              </a:rPr>
-              <a:t>Future scope</a:t>
-            </a:r>
-          </a:p>
-          <a:p>
-            <a:pPr algn="l"/>
-            <a:r>
-              <a:rPr lang="en-US" dirty="0">
-                <a:solidFill>
-                  <a:srgbClr val="24292F"/>
-                </a:solidFill>
-                <a:latin typeface="-apple-system"/>
-              </a:rPr>
-              <a:t>1.A</a:t>
-            </a:r>
-            <a:r>
-              <a:rPr lang="en-US" b="0" i="0" dirty="0">
-                <a:solidFill>
-                  <a:srgbClr val="24292F"/>
-                </a:solidFill>
-                <a:effectLst/>
-                <a:latin typeface="-apple-system"/>
-              </a:rPr>
-              <a:t>dding database for persistent storage</a:t>
-            </a:r>
-          </a:p>
-          <a:p>
-            <a:pPr algn="l"/>
-            <a:r>
-              <a:rPr lang="en-US" dirty="0">
-                <a:solidFill>
-                  <a:srgbClr val="24292F"/>
-                </a:solidFill>
-                <a:latin typeface="-apple-system"/>
-              </a:rPr>
-              <a:t>2.</a:t>
-            </a:r>
-            <a:r>
-              <a:rPr lang="en-US" b="1" dirty="0">
-                <a:solidFill>
-                  <a:srgbClr val="24292F"/>
-                </a:solidFill>
-                <a:latin typeface="-apple-system"/>
-              </a:rPr>
-              <a:t>Angular or ReactJS </a:t>
-            </a:r>
-            <a:r>
-              <a:rPr lang="en-US" dirty="0">
-                <a:solidFill>
-                  <a:srgbClr val="24292F"/>
-                </a:solidFill>
-                <a:latin typeface="-apple-system"/>
-              </a:rPr>
-              <a:t>to create Single page Reactive Application </a:t>
-            </a:r>
-          </a:p>
-          <a:p>
-            <a:pPr algn="l"/>
-            <a:r>
-              <a:rPr lang="en-US" dirty="0">
-                <a:solidFill>
-                  <a:srgbClr val="24292F"/>
-                </a:solidFill>
-                <a:latin typeface="-apple-system"/>
-              </a:rPr>
-              <a:t>3.Proper Authentication</a:t>
-            </a:r>
-          </a:p>
-        </p:txBody>
-      </p:sp>
+      </p:pic>
     </p:spTree>
     <p:extLst>
       <p:ext uri="{BB962C8B-B14F-4D97-AF65-F5344CB8AC3E}">
-        <p14:creationId xmlns:p14="http://schemas.microsoft.com/office/powerpoint/2010/main" val="2835828311"/>
+        <p14:creationId xmlns:p14="http://schemas.microsoft.com/office/powerpoint/2010/main" val="1805586523"/>
+      </p:ext>
+    </p:extLst>
+  </p:cSld>
+  <p:clrMapOvr>
+    <a:masterClrMapping/>
+  </p:clrMapOvr>
+</p:sld>
+</file>
+
+<file path=ppt/slides/slide9.xml><?xml version="1.0" encoding="utf-8"?>
+<p:sld xmlns:a="http://schemas.openxmlformats.org/drawingml/2006/main" xmlns:r="http://schemas.openxmlformats.org/officeDocument/2006/relationships" xmlns:p="http://schemas.openxmlformats.org/presentationml/2006/main">
+  <p:cSld>
+    <p:spTree>
+      <p:nvGrpSpPr>
+        <p:cNvPr id="1" name=""/>
+        <p:cNvGrpSpPr/>
+        <p:nvPr/>
+      </p:nvGrpSpPr>
+      <p:grpSpPr>
+        <a:xfrm>
+          <a:off x="0" y="0"/>
+          <a:ext cx="0" cy="0"/>
+          <a:chOff x="0" y="0"/>
+          <a:chExt cx="0" cy="0"/>
+        </a:xfrm>
+      </p:grpSpPr>
+      <p:sp>
+        <p:nvSpPr>
+          <p:cNvPr id="2" name="Title 1">
+            <a:extLst>
+              <a:ext uri="{FF2B5EF4-FFF2-40B4-BE49-F238E27FC236}">
+                <a16:creationId xmlns:a16="http://schemas.microsoft.com/office/drawing/2014/main" id="{41DB69CF-BEAE-DCF9-6BF8-0AD2B330619D}"/>
+              </a:ext>
+            </a:extLst>
+          </p:cNvPr>
+          <p:cNvSpPr>
+            <a:spLocks noGrp="1"/>
+          </p:cNvSpPr>
+          <p:nvPr>
+            <p:ph type="title"/>
+          </p:nvPr>
+        </p:nvSpPr>
+        <p:spPr/>
+        <p:txBody>
+          <a:bodyPr>
+            <a:normAutofit/>
+          </a:bodyPr>
+          <a:lstStyle/>
+          <a:p>
+            <a:r>
+              <a:rPr lang="en-IN" sz="2000" dirty="0">
+                <a:latin typeface="+mn-lt"/>
+              </a:rPr>
+              <a:t>Proper Form Validation</a:t>
+            </a:r>
+          </a:p>
+        </p:txBody>
+      </p:sp>
+      <p:pic>
+        <p:nvPicPr>
+          <p:cNvPr id="5" name="Content Placeholder 4">
+            <a:extLst>
+              <a:ext uri="{FF2B5EF4-FFF2-40B4-BE49-F238E27FC236}">
+                <a16:creationId xmlns:a16="http://schemas.microsoft.com/office/drawing/2014/main" id="{3E0566C9-5C5D-4D2B-4FDB-E681B4F176A8}"/>
+              </a:ext>
+            </a:extLst>
+          </p:cNvPr>
+          <p:cNvPicPr>
+            <a:picLocks noGrp="1" noChangeAspect="1"/>
+          </p:cNvPicPr>
+          <p:nvPr>
+            <p:ph idx="1"/>
+          </p:nvPr>
+        </p:nvPicPr>
+        <p:blipFill>
+          <a:blip r:embed="rId2"/>
+          <a:stretch>
+            <a:fillRect/>
+          </a:stretch>
+        </p:blipFill>
+        <p:spPr>
+          <a:xfrm>
+            <a:off x="982894" y="1592750"/>
+            <a:ext cx="10370906" cy="5149292"/>
+          </a:xfrm>
+        </p:spPr>
+      </p:pic>
+    </p:spTree>
+    <p:extLst>
+      <p:ext uri="{BB962C8B-B14F-4D97-AF65-F5344CB8AC3E}">
+        <p14:creationId xmlns:p14="http://schemas.microsoft.com/office/powerpoint/2010/main" val="3851210237"/>
       </p:ext>
     </p:extLst>
   </p:cSld>

</xml_diff>